<commit_message>
Documentation additions and add image to post fix
</commit_message>
<xml_diff>
--- a/Documentation/Presentation.pptx
+++ b/Documentation/Presentation.pptx
@@ -13,6 +13,7 @@
     <p:sldId id="261" r:id="rId7"/>
     <p:sldId id="262" r:id="rId8"/>
     <p:sldId id="263" r:id="rId9"/>
+    <p:sldId id="264" r:id="rId10"/>
   </p:sldIdLst>
   <p:sldSz cx="12192000" cy="6858000"/>
   <p:notesSz cx="6858000" cy="9144000"/>
@@ -111,6 +112,11 @@
       </a:defRPr>
     </a:lvl9pPr>
   </p:defaultTextStyle>
+  <p:extLst>
+    <p:ext uri="{EFAFB233-063F-42B5-8137-9DF3F51BA10A}">
+      <p15:sldGuideLst xmlns:p15="http://schemas.microsoft.com/office/powerpoint/2012/main"/>
+    </p:ext>
+  </p:extLst>
 </p:presentation>
 </file>
 
@@ -261,7 +267,7 @@
           <a:p>
             <a:fld id="{C962A05D-2C16-4961-9F29-EF2DA408E5F4}" type="datetimeFigureOut">
               <a:rPr lang="en-US" smtClean="0"/>
-              <a:t>8/4/2020</a:t>
+              <a:t>8/5/2020</a:t>
             </a:fld>
             <a:endParaRPr lang="en-US"/>
           </a:p>
@@ -459,7 +465,7 @@
           <a:p>
             <a:fld id="{C962A05D-2C16-4961-9F29-EF2DA408E5F4}" type="datetimeFigureOut">
               <a:rPr lang="en-US" smtClean="0"/>
-              <a:t>8/4/2020</a:t>
+              <a:t>8/5/2020</a:t>
             </a:fld>
             <a:endParaRPr lang="en-US"/>
           </a:p>
@@ -667,7 +673,7 @@
           <a:p>
             <a:fld id="{C962A05D-2C16-4961-9F29-EF2DA408E5F4}" type="datetimeFigureOut">
               <a:rPr lang="en-US" smtClean="0"/>
-              <a:t>8/4/2020</a:t>
+              <a:t>8/5/2020</a:t>
             </a:fld>
             <a:endParaRPr lang="en-US"/>
           </a:p>
@@ -865,7 +871,7 @@
           <a:p>
             <a:fld id="{C962A05D-2C16-4961-9F29-EF2DA408E5F4}" type="datetimeFigureOut">
               <a:rPr lang="en-US" smtClean="0"/>
-              <a:t>8/4/2020</a:t>
+              <a:t>8/5/2020</a:t>
             </a:fld>
             <a:endParaRPr lang="en-US"/>
           </a:p>
@@ -1140,7 +1146,7 @@
           <a:p>
             <a:fld id="{C962A05D-2C16-4961-9F29-EF2DA408E5F4}" type="datetimeFigureOut">
               <a:rPr lang="en-US" smtClean="0"/>
-              <a:t>8/4/2020</a:t>
+              <a:t>8/5/2020</a:t>
             </a:fld>
             <a:endParaRPr lang="en-US"/>
           </a:p>
@@ -1405,7 +1411,7 @@
           <a:p>
             <a:fld id="{C962A05D-2C16-4961-9F29-EF2DA408E5F4}" type="datetimeFigureOut">
               <a:rPr lang="en-US" smtClean="0"/>
-              <a:t>8/4/2020</a:t>
+              <a:t>8/5/2020</a:t>
             </a:fld>
             <a:endParaRPr lang="en-US"/>
           </a:p>
@@ -1817,7 +1823,7 @@
           <a:p>
             <a:fld id="{C962A05D-2C16-4961-9F29-EF2DA408E5F4}" type="datetimeFigureOut">
               <a:rPr lang="en-US" smtClean="0"/>
-              <a:t>8/4/2020</a:t>
+              <a:t>8/5/2020</a:t>
             </a:fld>
             <a:endParaRPr lang="en-US"/>
           </a:p>
@@ -1958,7 +1964,7 @@
           <a:p>
             <a:fld id="{C962A05D-2C16-4961-9F29-EF2DA408E5F4}" type="datetimeFigureOut">
               <a:rPr lang="en-US" smtClean="0"/>
-              <a:t>8/4/2020</a:t>
+              <a:t>8/5/2020</a:t>
             </a:fld>
             <a:endParaRPr lang="en-US"/>
           </a:p>
@@ -2071,7 +2077,7 @@
           <a:p>
             <a:fld id="{C962A05D-2C16-4961-9F29-EF2DA408E5F4}" type="datetimeFigureOut">
               <a:rPr lang="en-US" smtClean="0"/>
-              <a:t>8/4/2020</a:t>
+              <a:t>8/5/2020</a:t>
             </a:fld>
             <a:endParaRPr lang="en-US"/>
           </a:p>
@@ -2382,7 +2388,7 @@
           <a:p>
             <a:fld id="{C962A05D-2C16-4961-9F29-EF2DA408E5F4}" type="datetimeFigureOut">
               <a:rPr lang="en-US" smtClean="0"/>
-              <a:t>8/4/2020</a:t>
+              <a:t>8/5/2020</a:t>
             </a:fld>
             <a:endParaRPr lang="en-US"/>
           </a:p>
@@ -2670,7 +2676,7 @@
           <a:p>
             <a:fld id="{C962A05D-2C16-4961-9F29-EF2DA408E5F4}" type="datetimeFigureOut">
               <a:rPr lang="en-US" smtClean="0"/>
-              <a:t>8/4/2020</a:t>
+              <a:t>8/5/2020</a:t>
             </a:fld>
             <a:endParaRPr lang="en-US"/>
           </a:p>
@@ -2911,7 +2917,7 @@
           <a:p>
             <a:fld id="{C962A05D-2C16-4961-9F29-EF2DA408E5F4}" type="datetimeFigureOut">
               <a:rPr lang="en-US" smtClean="0"/>
-              <a:t>8/4/2020</a:t>
+              <a:t>8/5/2020</a:t>
             </a:fld>
             <a:endParaRPr lang="en-US"/>
           </a:p>
@@ -3430,6 +3436,52 @@
           <a:chExt cx="0" cy="0"/>
         </a:xfrm>
       </p:grpSpPr>
+      <p:sp>
+        <p:nvSpPr>
+          <p:cNvPr id="3" name="TextBox 2">
+            <a:extLst>
+              <a:ext uri="{FF2B5EF4-FFF2-40B4-BE49-F238E27FC236}">
+                <a16:creationId xmlns:a16="http://schemas.microsoft.com/office/drawing/2014/main" id="{D65E11F9-2D79-47E4-90FD-45E915B1CFF8}"/>
+              </a:ext>
+            </a:extLst>
+          </p:cNvPr>
+          <p:cNvSpPr txBox="1"/>
+          <p:nvPr/>
+        </p:nvSpPr>
+        <p:spPr>
+          <a:xfrm>
+            <a:off x="3739703" y="330740"/>
+            <a:ext cx="3794950" cy="769441"/>
+          </a:xfrm>
+          <a:prstGeom prst="rect">
+            <a:avLst/>
+          </a:prstGeom>
+          <a:noFill/>
+        </p:spPr>
+        <p:txBody>
+          <a:bodyPr wrap="none" rtlCol="0">
+            <a:spAutoFit/>
+          </a:bodyPr>
+          <a:lstStyle/>
+          <a:p>
+            <a:r>
+              <a:rPr lang="en-US" sz="4400" b="1" dirty="0">
+                <a:solidFill>
+                  <a:schemeClr val="bg1"/>
+                </a:solidFill>
+                <a:latin typeface="Poppins" panose="00000800000000000000"/>
+              </a:rPr>
+              <a:t>TECHNOLOGIES</a:t>
+            </a:r>
+            <a:endParaRPr lang="en-150" sz="4400" b="1" dirty="0">
+              <a:solidFill>
+                <a:schemeClr val="bg1"/>
+              </a:solidFill>
+              <a:latin typeface="Poppins" panose="00000800000000000000"/>
+            </a:endParaRPr>
+          </a:p>
+        </p:txBody>
+      </p:sp>
     </p:spTree>
     <p:extLst>
       <p:ext uri="{BB962C8B-B14F-4D97-AF65-F5344CB8AC3E}">
@@ -3509,7 +3561,7 @@
               <a:buNone/>
             </a:pPr>
             <a:r>
-              <a:rPr lang="en-US" dirty="0">
+              <a:rPr lang="en-US" sz="3200" b="1" dirty="0">
                 <a:latin typeface="Poppins" panose="00000800000000000000" pitchFamily="2" charset="0"/>
                 <a:cs typeface="Poppins" panose="00000800000000000000" pitchFamily="2" charset="0"/>
               </a:rPr>
@@ -3558,7 +3610,25 @@
                 <a:latin typeface="Poppins" panose="00000800000000000000" pitchFamily="2" charset="0"/>
                 <a:cs typeface="Poppins" panose="00000800000000000000" pitchFamily="2" charset="0"/>
               </a:rPr>
-              <a:t>Cron jobs</a:t>
+              <a:t>Commands for Cron job</a:t>
+            </a:r>
+          </a:p>
+          <a:p>
+            <a:r>
+              <a:rPr lang="en-US" dirty="0">
+                <a:latin typeface="Poppins" panose="00000800000000000000" pitchFamily="2" charset="0"/>
+                <a:cs typeface="Poppins" panose="00000800000000000000" pitchFamily="2" charset="0"/>
+              </a:rPr>
+              <a:t>Postman for testing HTTP Requests</a:t>
+            </a:r>
+          </a:p>
+          <a:p>
+            <a:r>
+              <a:rPr lang="en-US" dirty="0">
+                <a:latin typeface="Poppins" panose="00000800000000000000" pitchFamily="2" charset="0"/>
+                <a:cs typeface="Poppins" panose="00000800000000000000" pitchFamily="2" charset="0"/>
+              </a:rPr>
+              <a:t>Unit Tests</a:t>
             </a:r>
           </a:p>
           <a:p>
@@ -3645,7 +3715,7 @@
               <a:buNone/>
             </a:pPr>
             <a:r>
-              <a:rPr lang="en-US" dirty="0">
+              <a:rPr lang="en-US" sz="3200" b="1" dirty="0">
                 <a:latin typeface="Poppins" panose="00000800000000000000" pitchFamily="2" charset="0"/>
                 <a:cs typeface="Poppins" panose="00000800000000000000" pitchFamily="2" charset="0"/>
               </a:rPr>
@@ -3667,7 +3737,16 @@
                 <a:latin typeface="Poppins" panose="00000800000000000000" pitchFamily="2" charset="0"/>
                 <a:cs typeface="Poppins" panose="00000800000000000000" pitchFamily="2" charset="0"/>
               </a:rPr>
-              <a:t>React routing and </a:t>
+              <a:t>Design with Material Design Bootstrap and Adobe Illustrator</a:t>
+            </a:r>
+          </a:p>
+          <a:p>
+            <a:r>
+              <a:rPr lang="en-US" dirty="0">
+                <a:latin typeface="Poppins" panose="00000800000000000000" pitchFamily="2" charset="0"/>
+                <a:cs typeface="Poppins" panose="00000800000000000000" pitchFamily="2" charset="0"/>
+              </a:rPr>
+              <a:t>Routing with React Router</a:t>
             </a:r>
           </a:p>
           <a:p>
@@ -3782,7 +3861,7 @@
         </p:spPr>
         <p:txBody>
           <a:bodyPr>
-            <a:normAutofit fontScale="92500"/>
+            <a:normAutofit/>
           </a:bodyPr>
           <a:lstStyle/>
           <a:p>
@@ -3790,7 +3869,7 @@
               <a:buNone/>
             </a:pPr>
             <a:r>
-              <a:rPr lang="en-US" dirty="0">
+              <a:rPr lang="en-US" sz="3200" b="1" dirty="0">
                 <a:latin typeface="Poppins" panose="00000800000000000000" pitchFamily="2" charset="0"/>
                 <a:cs typeface="Poppins" panose="00000800000000000000" pitchFamily="2" charset="0"/>
               </a:rPr>
@@ -3812,7 +3891,7 @@
                 <a:latin typeface="Poppins" panose="00000800000000000000" pitchFamily="2" charset="0"/>
                 <a:cs typeface="Poppins" panose="00000800000000000000" pitchFamily="2" charset="0"/>
               </a:rPr>
-              <a:t>React Navigation 5</a:t>
+              <a:t>Design with React Native Paper</a:t>
             </a:r>
           </a:p>
           <a:p>
@@ -3821,7 +3900,7 @@
                 <a:latin typeface="Poppins" panose="00000800000000000000" pitchFamily="2" charset="0"/>
                 <a:cs typeface="Poppins" panose="00000800000000000000" pitchFamily="2" charset="0"/>
               </a:rPr>
-              <a:t>Posting text with pictures on timeline</a:t>
+              <a:t>React Navigation 5</a:t>
             </a:r>
           </a:p>
           <a:p>
@@ -3830,25 +3909,7 @@
                 <a:latin typeface="Poppins" panose="00000800000000000000" pitchFamily="2" charset="0"/>
                 <a:cs typeface="Poppins" panose="00000800000000000000" pitchFamily="2" charset="0"/>
               </a:rPr>
-              <a:t>Liking, commenting and sharing posts</a:t>
-            </a:r>
-          </a:p>
-          <a:p>
-            <a:r>
-              <a:rPr lang="en-US" dirty="0">
-                <a:latin typeface="Poppins" panose="00000800000000000000" pitchFamily="2" charset="0"/>
-                <a:cs typeface="Poppins" panose="00000800000000000000" pitchFamily="2" charset="0"/>
-              </a:rPr>
-              <a:t>Follower system like Instagram</a:t>
-            </a:r>
-          </a:p>
-          <a:p>
-            <a:r>
-              <a:rPr lang="en-US" dirty="0">
-                <a:latin typeface="Poppins" panose="00000800000000000000" pitchFamily="2" charset="0"/>
-                <a:cs typeface="Poppins" panose="00000800000000000000" pitchFamily="2" charset="0"/>
-              </a:rPr>
-              <a:t>Viewing own profile and other profiles</a:t>
+              <a:t>Every feature like on website</a:t>
             </a:r>
           </a:p>
           <a:p>
@@ -3950,7 +4011,7 @@
               <a:buNone/>
             </a:pPr>
             <a:r>
-              <a:rPr lang="en-US" dirty="0">
+              <a:rPr lang="en-US" sz="3200" b="1" dirty="0">
                 <a:latin typeface="Poppins" panose="00000800000000000000" pitchFamily="2" charset="0"/>
                 <a:cs typeface="Poppins" panose="00000800000000000000" pitchFamily="2" charset="0"/>
               </a:rPr>
@@ -4096,7 +4157,7 @@
               <a:buNone/>
             </a:pPr>
             <a:r>
-              <a:rPr lang="en-US" dirty="0">
+              <a:rPr lang="en-US" sz="3200" b="1" dirty="0">
                 <a:latin typeface="Poppins" panose="00000800000000000000" pitchFamily="2" charset="0"/>
                 <a:cs typeface="Poppins" panose="00000800000000000000" pitchFamily="2" charset="0"/>
               </a:rPr>
@@ -4163,6 +4224,86 @@
     <p:extLst>
       <p:ext uri="{BB962C8B-B14F-4D97-AF65-F5344CB8AC3E}">
         <p14:creationId xmlns:p14="http://schemas.microsoft.com/office/powerpoint/2010/main" val="2376609314"/>
+      </p:ext>
+    </p:extLst>
+  </p:cSld>
+  <p:clrMapOvr>
+    <a:masterClrMapping/>
+  </p:clrMapOvr>
+</p:sld>
+</file>
+
+<file path=ppt/slides/slide9.xml><?xml version="1.0" encoding="utf-8"?>
+<p:sld xmlns:a="http://schemas.openxmlformats.org/drawingml/2006/main" xmlns:r="http://schemas.openxmlformats.org/officeDocument/2006/relationships" xmlns:p="http://schemas.openxmlformats.org/presentationml/2006/main">
+  <p:cSld>
+    <p:bg>
+      <p:bgPr>
+        <a:blipFill dpi="0" rotWithShape="1">
+          <a:blip r:embed="rId2">
+            <a:lum/>
+          </a:blip>
+          <a:srcRect/>
+          <a:stretch>
+            <a:fillRect/>
+          </a:stretch>
+        </a:blipFill>
+        <a:effectLst/>
+      </p:bgPr>
+    </p:bg>
+    <p:spTree>
+      <p:nvGrpSpPr>
+        <p:cNvPr id="1" name=""/>
+        <p:cNvGrpSpPr/>
+        <p:nvPr/>
+      </p:nvGrpSpPr>
+      <p:grpSpPr>
+        <a:xfrm>
+          <a:off x="0" y="0"/>
+          <a:ext cx="0" cy="0"/>
+          <a:chOff x="0" y="0"/>
+          <a:chExt cx="0" cy="0"/>
+        </a:xfrm>
+      </p:grpSpPr>
+      <p:pic>
+        <p:nvPicPr>
+          <p:cNvPr id="7" name="Picture 6">
+            <a:extLst>
+              <a:ext uri="{FF2B5EF4-FFF2-40B4-BE49-F238E27FC236}">
+                <a16:creationId xmlns:a16="http://schemas.microsoft.com/office/drawing/2014/main" id="{051682AA-FF96-42A3-A1B2-CEC5EC69C2AD}"/>
+              </a:ext>
+            </a:extLst>
+          </p:cNvPr>
+          <p:cNvPicPr>
+            <a:picLocks noChangeAspect="1"/>
+          </p:cNvPicPr>
+          <p:nvPr/>
+        </p:nvPicPr>
+        <p:blipFill>
+          <a:blip r:embed="rId3">
+            <a:extLst>
+              <a:ext uri="{28A0092B-C50C-407E-A947-70E740481C1C}">
+                <a14:useLocalDpi xmlns:a14="http://schemas.microsoft.com/office/drawing/2010/main" val="0"/>
+              </a:ext>
+            </a:extLst>
+          </a:blip>
+          <a:stretch>
+            <a:fillRect/>
+          </a:stretch>
+        </p:blipFill>
+        <p:spPr>
+          <a:xfrm>
+            <a:off x="4007796" y="113914"/>
+            <a:ext cx="4598668" cy="6209063"/>
+          </a:xfrm>
+          <a:prstGeom prst="rect">
+            <a:avLst/>
+          </a:prstGeom>
+        </p:spPr>
+      </p:pic>
+    </p:spTree>
+    <p:extLst>
+      <p:ext uri="{BB962C8B-B14F-4D97-AF65-F5344CB8AC3E}">
+        <p14:creationId xmlns:p14="http://schemas.microsoft.com/office/powerpoint/2010/main" val="3212381746"/>
       </p:ext>
     </p:extLst>
   </p:cSld>

</xml_diff>

<commit_message>
Sitemap.xml generator, fixes on mobile app, documentation improved
</commit_message>
<xml_diff>
--- a/Documentation/Presentation.pptx
+++ b/Documentation/Presentation.pptx
@@ -267,7 +267,7 @@
           <a:p>
             <a:fld id="{C962A05D-2C16-4961-9F29-EF2DA408E5F4}" type="datetimeFigureOut">
               <a:rPr lang="en-US" smtClean="0"/>
-              <a:t>8/5/2020</a:t>
+              <a:t>8/9/2020</a:t>
             </a:fld>
             <a:endParaRPr lang="en-US"/>
           </a:p>
@@ -465,7 +465,7 @@
           <a:p>
             <a:fld id="{C962A05D-2C16-4961-9F29-EF2DA408E5F4}" type="datetimeFigureOut">
               <a:rPr lang="en-US" smtClean="0"/>
-              <a:t>8/5/2020</a:t>
+              <a:t>8/9/2020</a:t>
             </a:fld>
             <a:endParaRPr lang="en-US"/>
           </a:p>
@@ -673,7 +673,7 @@
           <a:p>
             <a:fld id="{C962A05D-2C16-4961-9F29-EF2DA408E5F4}" type="datetimeFigureOut">
               <a:rPr lang="en-US" smtClean="0"/>
-              <a:t>8/5/2020</a:t>
+              <a:t>8/9/2020</a:t>
             </a:fld>
             <a:endParaRPr lang="en-US"/>
           </a:p>
@@ -871,7 +871,7 @@
           <a:p>
             <a:fld id="{C962A05D-2C16-4961-9F29-EF2DA408E5F4}" type="datetimeFigureOut">
               <a:rPr lang="en-US" smtClean="0"/>
-              <a:t>8/5/2020</a:t>
+              <a:t>8/9/2020</a:t>
             </a:fld>
             <a:endParaRPr lang="en-US"/>
           </a:p>
@@ -1146,7 +1146,7 @@
           <a:p>
             <a:fld id="{C962A05D-2C16-4961-9F29-EF2DA408E5F4}" type="datetimeFigureOut">
               <a:rPr lang="en-US" smtClean="0"/>
-              <a:t>8/5/2020</a:t>
+              <a:t>8/9/2020</a:t>
             </a:fld>
             <a:endParaRPr lang="en-US"/>
           </a:p>
@@ -1411,7 +1411,7 @@
           <a:p>
             <a:fld id="{C962A05D-2C16-4961-9F29-EF2DA408E5F4}" type="datetimeFigureOut">
               <a:rPr lang="en-US" smtClean="0"/>
-              <a:t>8/5/2020</a:t>
+              <a:t>8/9/2020</a:t>
             </a:fld>
             <a:endParaRPr lang="en-US"/>
           </a:p>
@@ -1823,7 +1823,7 @@
           <a:p>
             <a:fld id="{C962A05D-2C16-4961-9F29-EF2DA408E5F4}" type="datetimeFigureOut">
               <a:rPr lang="en-US" smtClean="0"/>
-              <a:t>8/5/2020</a:t>
+              <a:t>8/9/2020</a:t>
             </a:fld>
             <a:endParaRPr lang="en-US"/>
           </a:p>
@@ -1964,7 +1964,7 @@
           <a:p>
             <a:fld id="{C962A05D-2C16-4961-9F29-EF2DA408E5F4}" type="datetimeFigureOut">
               <a:rPr lang="en-US" smtClean="0"/>
-              <a:t>8/5/2020</a:t>
+              <a:t>8/9/2020</a:t>
             </a:fld>
             <a:endParaRPr lang="en-US"/>
           </a:p>
@@ -2077,7 +2077,7 @@
           <a:p>
             <a:fld id="{C962A05D-2C16-4961-9F29-EF2DA408E5F4}" type="datetimeFigureOut">
               <a:rPr lang="en-US" smtClean="0"/>
-              <a:t>8/5/2020</a:t>
+              <a:t>8/9/2020</a:t>
             </a:fld>
             <a:endParaRPr lang="en-US"/>
           </a:p>
@@ -2388,7 +2388,7 @@
           <a:p>
             <a:fld id="{C962A05D-2C16-4961-9F29-EF2DA408E5F4}" type="datetimeFigureOut">
               <a:rPr lang="en-US" smtClean="0"/>
-              <a:t>8/5/2020</a:t>
+              <a:t>8/9/2020</a:t>
             </a:fld>
             <a:endParaRPr lang="en-US"/>
           </a:p>
@@ -2676,7 +2676,7 @@
           <a:p>
             <a:fld id="{C962A05D-2C16-4961-9F29-EF2DA408E5F4}" type="datetimeFigureOut">
               <a:rPr lang="en-US" smtClean="0"/>
-              <a:t>8/5/2020</a:t>
+              <a:t>8/9/2020</a:t>
             </a:fld>
             <a:endParaRPr lang="en-US"/>
           </a:p>
@@ -2917,7 +2917,7 @@
           <a:p>
             <a:fld id="{C962A05D-2C16-4961-9F29-EF2DA408E5F4}" type="datetimeFigureOut">
               <a:rPr lang="en-US" smtClean="0"/>
-              <a:t>8/5/2020</a:t>
+              <a:t>8/9/2020</a:t>
             </a:fld>
             <a:endParaRPr lang="en-US"/>
           </a:p>
@@ -3707,7 +3707,7 @@
         </p:spPr>
         <p:txBody>
           <a:bodyPr>
-            <a:normAutofit lnSpcReduction="10000"/>
+            <a:normAutofit/>
           </a:bodyPr>
           <a:lstStyle/>
           <a:p>
@@ -3737,7 +3737,7 @@
                 <a:latin typeface="Poppins" panose="00000800000000000000" pitchFamily="2" charset="0"/>
                 <a:cs typeface="Poppins" panose="00000800000000000000" pitchFamily="2" charset="0"/>
               </a:rPr>
-              <a:t>Design with Material Design Bootstrap and Adobe Illustrator</a:t>
+              <a:t>Routing with React Router</a:t>
             </a:r>
           </a:p>
           <a:p>
@@ -3746,7 +3746,7 @@
                 <a:latin typeface="Poppins" panose="00000800000000000000" pitchFamily="2" charset="0"/>
                 <a:cs typeface="Poppins" panose="00000800000000000000" pitchFamily="2" charset="0"/>
               </a:rPr>
-              <a:t>Routing with React Router</a:t>
+              <a:t>SEO optimization</a:t>
             </a:r>
           </a:p>
           <a:p>
@@ -3755,41 +3755,8 @@
                 <a:latin typeface="Poppins" panose="00000800000000000000" pitchFamily="2" charset="0"/>
                 <a:cs typeface="Poppins" panose="00000800000000000000" pitchFamily="2" charset="0"/>
               </a:rPr>
-              <a:t>Posting text with pictures on timeline</a:t>
-            </a:r>
-          </a:p>
-          <a:p>
-            <a:r>
-              <a:rPr lang="en-US" dirty="0">
-                <a:latin typeface="Poppins" panose="00000800000000000000" pitchFamily="2" charset="0"/>
-                <a:cs typeface="Poppins" panose="00000800000000000000" pitchFamily="2" charset="0"/>
-              </a:rPr>
-              <a:t>Liking, commenting and sharing posts</a:t>
-            </a:r>
-          </a:p>
-          <a:p>
-            <a:r>
-              <a:rPr lang="en-US" dirty="0">
-                <a:latin typeface="Poppins" panose="00000800000000000000" pitchFamily="2" charset="0"/>
-                <a:cs typeface="Poppins" panose="00000800000000000000" pitchFamily="2" charset="0"/>
-              </a:rPr>
-              <a:t>Follower system like Instagram</a:t>
-            </a:r>
-          </a:p>
-          <a:p>
-            <a:r>
-              <a:rPr lang="en-US" dirty="0">
-                <a:latin typeface="Poppins" panose="00000800000000000000" pitchFamily="2" charset="0"/>
-                <a:cs typeface="Poppins" panose="00000800000000000000" pitchFamily="2" charset="0"/>
-              </a:rPr>
-              <a:t>Viewing own profile and other profiles</a:t>
-            </a:r>
-          </a:p>
-          <a:p>
-            <a:endParaRPr lang="en-US" dirty="0">
-              <a:latin typeface="Poppins" panose="00000800000000000000" pitchFamily="2" charset="0"/>
-              <a:cs typeface="Poppins" panose="00000800000000000000" pitchFamily="2" charset="0"/>
-            </a:endParaRPr>
+              <a:t>Design with Material Design Bootstrap and Adobe Illustrator</a:t>
+            </a:r>
           </a:p>
         </p:txBody>
       </p:sp>
@@ -3909,16 +3876,7 @@
                 <a:latin typeface="Poppins" panose="00000800000000000000" pitchFamily="2" charset="0"/>
                 <a:cs typeface="Poppins" panose="00000800000000000000" pitchFamily="2" charset="0"/>
               </a:rPr>
-              <a:t>Every feature like on website</a:t>
-            </a:r>
-          </a:p>
-          <a:p>
-            <a:r>
-              <a:rPr lang="en-US" dirty="0">
-                <a:latin typeface="Poppins" panose="00000800000000000000" pitchFamily="2" charset="0"/>
-                <a:cs typeface="Poppins" panose="00000800000000000000" pitchFamily="2" charset="0"/>
-              </a:rPr>
-              <a:t>Real time chat system</a:t>
+              <a:t>Real time chat system with Node.js</a:t>
             </a:r>
           </a:p>
           <a:p>

</xml_diff>

<commit_message>
Emoji picker z-index bug fix
</commit_message>
<xml_diff>
--- a/Documentation/Presentation.pptx
+++ b/Documentation/Presentation.pptx
@@ -267,7 +267,7 @@
           <a:p>
             <a:fld id="{C962A05D-2C16-4961-9F29-EF2DA408E5F4}" type="datetimeFigureOut">
               <a:rPr lang="en-US" smtClean="0"/>
-              <a:t>8/9/2020</a:t>
+              <a:t>8/10/2020</a:t>
             </a:fld>
             <a:endParaRPr lang="en-US"/>
           </a:p>
@@ -465,7 +465,7 @@
           <a:p>
             <a:fld id="{C962A05D-2C16-4961-9F29-EF2DA408E5F4}" type="datetimeFigureOut">
               <a:rPr lang="en-US" smtClean="0"/>
-              <a:t>8/9/2020</a:t>
+              <a:t>8/10/2020</a:t>
             </a:fld>
             <a:endParaRPr lang="en-US"/>
           </a:p>
@@ -673,7 +673,7 @@
           <a:p>
             <a:fld id="{C962A05D-2C16-4961-9F29-EF2DA408E5F4}" type="datetimeFigureOut">
               <a:rPr lang="en-US" smtClean="0"/>
-              <a:t>8/9/2020</a:t>
+              <a:t>8/10/2020</a:t>
             </a:fld>
             <a:endParaRPr lang="en-US"/>
           </a:p>
@@ -871,7 +871,7 @@
           <a:p>
             <a:fld id="{C962A05D-2C16-4961-9F29-EF2DA408E5F4}" type="datetimeFigureOut">
               <a:rPr lang="en-US" smtClean="0"/>
-              <a:t>8/9/2020</a:t>
+              <a:t>8/10/2020</a:t>
             </a:fld>
             <a:endParaRPr lang="en-US"/>
           </a:p>
@@ -1146,7 +1146,7 @@
           <a:p>
             <a:fld id="{C962A05D-2C16-4961-9F29-EF2DA408E5F4}" type="datetimeFigureOut">
               <a:rPr lang="en-US" smtClean="0"/>
-              <a:t>8/9/2020</a:t>
+              <a:t>8/10/2020</a:t>
             </a:fld>
             <a:endParaRPr lang="en-US"/>
           </a:p>
@@ -1411,7 +1411,7 @@
           <a:p>
             <a:fld id="{C962A05D-2C16-4961-9F29-EF2DA408E5F4}" type="datetimeFigureOut">
               <a:rPr lang="en-US" smtClean="0"/>
-              <a:t>8/9/2020</a:t>
+              <a:t>8/10/2020</a:t>
             </a:fld>
             <a:endParaRPr lang="en-US"/>
           </a:p>
@@ -1823,7 +1823,7 @@
           <a:p>
             <a:fld id="{C962A05D-2C16-4961-9F29-EF2DA408E5F4}" type="datetimeFigureOut">
               <a:rPr lang="en-US" smtClean="0"/>
-              <a:t>8/9/2020</a:t>
+              <a:t>8/10/2020</a:t>
             </a:fld>
             <a:endParaRPr lang="en-US"/>
           </a:p>
@@ -1964,7 +1964,7 @@
           <a:p>
             <a:fld id="{C962A05D-2C16-4961-9F29-EF2DA408E5F4}" type="datetimeFigureOut">
               <a:rPr lang="en-US" smtClean="0"/>
-              <a:t>8/9/2020</a:t>
+              <a:t>8/10/2020</a:t>
             </a:fld>
             <a:endParaRPr lang="en-US"/>
           </a:p>
@@ -2077,7 +2077,7 @@
           <a:p>
             <a:fld id="{C962A05D-2C16-4961-9F29-EF2DA408E5F4}" type="datetimeFigureOut">
               <a:rPr lang="en-US" smtClean="0"/>
-              <a:t>8/9/2020</a:t>
+              <a:t>8/10/2020</a:t>
             </a:fld>
             <a:endParaRPr lang="en-US"/>
           </a:p>
@@ -2388,7 +2388,7 @@
           <a:p>
             <a:fld id="{C962A05D-2C16-4961-9F29-EF2DA408E5F4}" type="datetimeFigureOut">
               <a:rPr lang="en-US" smtClean="0"/>
-              <a:t>8/9/2020</a:t>
+              <a:t>8/10/2020</a:t>
             </a:fld>
             <a:endParaRPr lang="en-US"/>
           </a:p>
@@ -2676,7 +2676,7 @@
           <a:p>
             <a:fld id="{C962A05D-2C16-4961-9F29-EF2DA408E5F4}" type="datetimeFigureOut">
               <a:rPr lang="en-US" smtClean="0"/>
-              <a:t>8/9/2020</a:t>
+              <a:t>8/10/2020</a:t>
             </a:fld>
             <a:endParaRPr lang="en-US"/>
           </a:p>
@@ -2917,7 +2917,7 @@
           <a:p>
             <a:fld id="{C962A05D-2C16-4961-9F29-EF2DA408E5F4}" type="datetimeFigureOut">
               <a:rPr lang="en-US" smtClean="0"/>
-              <a:t>8/9/2020</a:t>
+              <a:t>8/10/2020</a:t>
             </a:fld>
             <a:endParaRPr lang="en-US"/>
           </a:p>
@@ -3610,8 +3610,19 @@
                 <a:latin typeface="Poppins" panose="00000800000000000000" pitchFamily="2" charset="0"/>
                 <a:cs typeface="Poppins" panose="00000800000000000000" pitchFamily="2" charset="0"/>
               </a:rPr>
-              <a:t>Commands for Cron job</a:t>
-            </a:r>
+              <a:t>Push Notifications </a:t>
+            </a:r>
+            <a:r>
+              <a:rPr lang="en-US">
+                <a:latin typeface="Poppins" panose="00000800000000000000" pitchFamily="2" charset="0"/>
+                <a:cs typeface="Poppins" panose="00000800000000000000" pitchFamily="2" charset="0"/>
+              </a:rPr>
+              <a:t>with Firebase</a:t>
+            </a:r>
+            <a:endParaRPr lang="en-US" dirty="0">
+              <a:latin typeface="Poppins" panose="00000800000000000000" pitchFamily="2" charset="0"/>
+              <a:cs typeface="Poppins" panose="00000800000000000000" pitchFamily="2" charset="0"/>
+            </a:endParaRPr>
           </a:p>
           <a:p>
             <a:r>

</xml_diff>